<commit_message>
beta of Nbmodel really with some runtime issues for eval
</commit_message>
<xml_diff>
--- a/NLP Language Presentation.pptx
+++ b/NLP Language Presentation.pptx
@@ -4,13 +4,16 @@
   <p:sldMasterIdLst>
     <p:sldMasterId id="2147483648" r:id="rId1"/>
   </p:sldMasterIdLst>
+  <p:notesMasterIdLst>
+    <p:notesMasterId r:id="rId9"/>
+  </p:notesMasterIdLst>
   <p:sldIdLst>
     <p:sldId id="256" r:id="rId2"/>
     <p:sldId id="257" r:id="rId3"/>
-    <p:sldId id="260" r:id="rId4"/>
-    <p:sldId id="258" r:id="rId5"/>
-    <p:sldId id="261" r:id="rId6"/>
-    <p:sldId id="259" r:id="rId7"/>
+    <p:sldId id="259" r:id="rId4"/>
+    <p:sldId id="264" r:id="rId5"/>
+    <p:sldId id="263" r:id="rId6"/>
+    <p:sldId id="261" r:id="rId7"/>
     <p:sldId id="262" r:id="rId8"/>
   </p:sldIdLst>
   <p:sldSz cx="12192000" cy="6858000"/>
@@ -110,7 +113,608 @@
       </a:defRPr>
     </a:lvl9pPr>
   </p:defaultTextStyle>
+  <p:extLst>
+    <p:ext uri="{EFAFB233-063F-42B5-8137-9DF3F51BA10A}">
+      <p15:sldGuideLst xmlns:p15="http://schemas.microsoft.com/office/powerpoint/2012/main"/>
+    </p:ext>
+  </p:extLst>
 </p:presentation>
+</file>
+
+<file path=ppt/notesMasters/notesMaster1.xml><?xml version="1.0" encoding="utf-8"?>
+<p:notesMaster xmlns:a="http://schemas.openxmlformats.org/drawingml/2006/main" xmlns:r="http://schemas.openxmlformats.org/officeDocument/2006/relationships" xmlns:p="http://schemas.openxmlformats.org/presentationml/2006/main">
+  <p:cSld>
+    <p:bg>
+      <p:bgRef idx="1001">
+        <a:schemeClr val="bg1"/>
+      </p:bgRef>
+    </p:bg>
+    <p:spTree>
+      <p:nvGrpSpPr>
+        <p:cNvPr id="1" name=""/>
+        <p:cNvGrpSpPr/>
+        <p:nvPr/>
+      </p:nvGrpSpPr>
+      <p:grpSpPr>
+        <a:xfrm>
+          <a:off x="0" y="0"/>
+          <a:ext cx="0" cy="0"/>
+          <a:chOff x="0" y="0"/>
+          <a:chExt cx="0" cy="0"/>
+        </a:xfrm>
+      </p:grpSpPr>
+      <p:sp>
+        <p:nvSpPr>
+          <p:cNvPr id="2" name="Header Placeholder 1"/>
+          <p:cNvSpPr>
+            <a:spLocks noGrp="1"/>
+          </p:cNvSpPr>
+          <p:nvPr>
+            <p:ph type="hdr" sz="quarter"/>
+          </p:nvPr>
+        </p:nvSpPr>
+        <p:spPr>
+          <a:xfrm>
+            <a:off x="0" y="0"/>
+            <a:ext cx="2971800" cy="458788"/>
+          </a:xfrm>
+          <a:prstGeom prst="rect">
+            <a:avLst/>
+          </a:prstGeom>
+        </p:spPr>
+        <p:txBody>
+          <a:bodyPr vert="horz" lIns="91440" tIns="45720" rIns="91440" bIns="45720" rtlCol="0"/>
+          <a:lstStyle>
+            <a:lvl1pPr algn="l">
+              <a:defRPr sz="1200"/>
+            </a:lvl1pPr>
+          </a:lstStyle>
+          <a:p>
+            <a:endParaRPr lang="en-US"/>
+          </a:p>
+        </p:txBody>
+      </p:sp>
+      <p:sp>
+        <p:nvSpPr>
+          <p:cNvPr id="3" name="Date Placeholder 2"/>
+          <p:cNvSpPr>
+            <a:spLocks noGrp="1"/>
+          </p:cNvSpPr>
+          <p:nvPr>
+            <p:ph type="dt" idx="1"/>
+          </p:nvPr>
+        </p:nvSpPr>
+        <p:spPr>
+          <a:xfrm>
+            <a:off x="3884613" y="0"/>
+            <a:ext cx="2971800" cy="458788"/>
+          </a:xfrm>
+          <a:prstGeom prst="rect">
+            <a:avLst/>
+          </a:prstGeom>
+        </p:spPr>
+        <p:txBody>
+          <a:bodyPr vert="horz" lIns="91440" tIns="45720" rIns="91440" bIns="45720" rtlCol="0"/>
+          <a:lstStyle>
+            <a:lvl1pPr algn="r">
+              <a:defRPr sz="1200"/>
+            </a:lvl1pPr>
+          </a:lstStyle>
+          <a:p>
+            <a:fld id="{5DE2157A-685E-F643-A37D-FF813E295356}" type="datetimeFigureOut">
+              <a:rPr lang="en-US" smtClean="0"/>
+              <a:t>10/5/16</a:t>
+            </a:fld>
+            <a:endParaRPr lang="en-US"/>
+          </a:p>
+        </p:txBody>
+      </p:sp>
+      <p:sp>
+        <p:nvSpPr>
+          <p:cNvPr id="4" name="Slide Image Placeholder 3"/>
+          <p:cNvSpPr>
+            <a:spLocks noGrp="1" noRot="1" noChangeAspect="1"/>
+          </p:cNvSpPr>
+          <p:nvPr>
+            <p:ph type="sldImg" idx="2"/>
+          </p:nvPr>
+        </p:nvSpPr>
+        <p:spPr>
+          <a:xfrm>
+            <a:off x="685800" y="1143000"/>
+            <a:ext cx="5486400" cy="3086100"/>
+          </a:xfrm>
+          <a:prstGeom prst="rect">
+            <a:avLst/>
+          </a:prstGeom>
+          <a:noFill/>
+          <a:ln w="12700">
+            <a:solidFill>
+              <a:prstClr val="black"/>
+            </a:solidFill>
+          </a:ln>
+        </p:spPr>
+        <p:txBody>
+          <a:bodyPr vert="horz" lIns="91440" tIns="45720" rIns="91440" bIns="45720" rtlCol="0" anchor="ctr"/>
+          <a:lstStyle/>
+          <a:p>
+            <a:endParaRPr lang="en-US"/>
+          </a:p>
+        </p:txBody>
+      </p:sp>
+      <p:sp>
+        <p:nvSpPr>
+          <p:cNvPr id="5" name="Notes Placeholder 4"/>
+          <p:cNvSpPr>
+            <a:spLocks noGrp="1"/>
+          </p:cNvSpPr>
+          <p:nvPr>
+            <p:ph type="body" sz="quarter" idx="3"/>
+          </p:nvPr>
+        </p:nvSpPr>
+        <p:spPr>
+          <a:xfrm>
+            <a:off x="685800" y="4400550"/>
+            <a:ext cx="5486400" cy="3600450"/>
+          </a:xfrm>
+          <a:prstGeom prst="rect">
+            <a:avLst/>
+          </a:prstGeom>
+        </p:spPr>
+        <p:txBody>
+          <a:bodyPr vert="horz" lIns="91440" tIns="45720" rIns="91440" bIns="45720" rtlCol="0"/>
+          <a:lstStyle/>
+          <a:p>
+            <a:pPr lvl="0"/>
+            <a:r>
+              <a:rPr lang="en-US" smtClean="0"/>
+              <a:t>Click to edit Master text styles</a:t>
+            </a:r>
+          </a:p>
+          <a:p>
+            <a:pPr lvl="1"/>
+            <a:r>
+              <a:rPr lang="en-US" smtClean="0"/>
+              <a:t>Second level</a:t>
+            </a:r>
+          </a:p>
+          <a:p>
+            <a:pPr lvl="2"/>
+            <a:r>
+              <a:rPr lang="en-US" smtClean="0"/>
+              <a:t>Third level</a:t>
+            </a:r>
+          </a:p>
+          <a:p>
+            <a:pPr lvl="3"/>
+            <a:r>
+              <a:rPr lang="en-US" smtClean="0"/>
+              <a:t>Fourth level</a:t>
+            </a:r>
+          </a:p>
+          <a:p>
+            <a:pPr lvl="4"/>
+            <a:r>
+              <a:rPr lang="en-US" smtClean="0"/>
+              <a:t>Fifth level</a:t>
+            </a:r>
+            <a:endParaRPr lang="en-US"/>
+          </a:p>
+        </p:txBody>
+      </p:sp>
+      <p:sp>
+        <p:nvSpPr>
+          <p:cNvPr id="6" name="Footer Placeholder 5"/>
+          <p:cNvSpPr>
+            <a:spLocks noGrp="1"/>
+          </p:cNvSpPr>
+          <p:nvPr>
+            <p:ph type="ftr" sz="quarter" idx="4"/>
+          </p:nvPr>
+        </p:nvSpPr>
+        <p:spPr>
+          <a:xfrm>
+            <a:off x="0" y="8685213"/>
+            <a:ext cx="2971800" cy="458787"/>
+          </a:xfrm>
+          <a:prstGeom prst="rect">
+            <a:avLst/>
+          </a:prstGeom>
+        </p:spPr>
+        <p:txBody>
+          <a:bodyPr vert="horz" lIns="91440" tIns="45720" rIns="91440" bIns="45720" rtlCol="0" anchor="b"/>
+          <a:lstStyle>
+            <a:lvl1pPr algn="l">
+              <a:defRPr sz="1200"/>
+            </a:lvl1pPr>
+          </a:lstStyle>
+          <a:p>
+            <a:endParaRPr lang="en-US"/>
+          </a:p>
+        </p:txBody>
+      </p:sp>
+      <p:sp>
+        <p:nvSpPr>
+          <p:cNvPr id="7" name="Slide Number Placeholder 6"/>
+          <p:cNvSpPr>
+            <a:spLocks noGrp="1"/>
+          </p:cNvSpPr>
+          <p:nvPr>
+            <p:ph type="sldNum" sz="quarter" idx="5"/>
+          </p:nvPr>
+        </p:nvSpPr>
+        <p:spPr>
+          <a:xfrm>
+            <a:off x="3884613" y="8685213"/>
+            <a:ext cx="2971800" cy="458787"/>
+          </a:xfrm>
+          <a:prstGeom prst="rect">
+            <a:avLst/>
+          </a:prstGeom>
+        </p:spPr>
+        <p:txBody>
+          <a:bodyPr vert="horz" lIns="91440" tIns="45720" rIns="91440" bIns="45720" rtlCol="0" anchor="b"/>
+          <a:lstStyle>
+            <a:lvl1pPr algn="r">
+              <a:defRPr sz="1200"/>
+            </a:lvl1pPr>
+          </a:lstStyle>
+          <a:p>
+            <a:fld id="{77153788-2A0D-934D-BA08-953AD1B5A04C}" type="slidenum">
+              <a:rPr lang="en-US" smtClean="0"/>
+              <a:t>‹#›</a:t>
+            </a:fld>
+            <a:endParaRPr lang="en-US"/>
+          </a:p>
+        </p:txBody>
+      </p:sp>
+    </p:spTree>
+    <p:extLst>
+      <p:ext uri="{BB962C8B-B14F-4D97-AF65-F5344CB8AC3E}">
+        <p14:creationId xmlns:p14="http://schemas.microsoft.com/office/powerpoint/2010/main" val="2048465835"/>
+      </p:ext>
+    </p:extLst>
+  </p:cSld>
+  <p:clrMap bg1="lt1" tx1="dk1" bg2="lt2" tx2="dk2" accent1="accent1" accent2="accent2" accent3="accent3" accent4="accent4" accent5="accent5" accent6="accent6" hlink="hlink" folHlink="folHlink"/>
+  <p:notesStyle>
+    <a:lvl1pPr marL="0" algn="l" defTabSz="914400" rtl="0" eaLnBrk="1" latinLnBrk="0" hangingPunct="1">
+      <a:defRPr sz="1200" kern="1200">
+        <a:solidFill>
+          <a:schemeClr val="tx1"/>
+        </a:solidFill>
+        <a:latin typeface="+mn-lt"/>
+        <a:ea typeface="+mn-ea"/>
+        <a:cs typeface="+mn-cs"/>
+      </a:defRPr>
+    </a:lvl1pPr>
+    <a:lvl2pPr marL="457200" algn="l" defTabSz="914400" rtl="0" eaLnBrk="1" latinLnBrk="0" hangingPunct="1">
+      <a:defRPr sz="1200" kern="1200">
+        <a:solidFill>
+          <a:schemeClr val="tx1"/>
+        </a:solidFill>
+        <a:latin typeface="+mn-lt"/>
+        <a:ea typeface="+mn-ea"/>
+        <a:cs typeface="+mn-cs"/>
+      </a:defRPr>
+    </a:lvl2pPr>
+    <a:lvl3pPr marL="914400" algn="l" defTabSz="914400" rtl="0" eaLnBrk="1" latinLnBrk="0" hangingPunct="1">
+      <a:defRPr sz="1200" kern="1200">
+        <a:solidFill>
+          <a:schemeClr val="tx1"/>
+        </a:solidFill>
+        <a:latin typeface="+mn-lt"/>
+        <a:ea typeface="+mn-ea"/>
+        <a:cs typeface="+mn-cs"/>
+      </a:defRPr>
+    </a:lvl3pPr>
+    <a:lvl4pPr marL="1371600" algn="l" defTabSz="914400" rtl="0" eaLnBrk="1" latinLnBrk="0" hangingPunct="1">
+      <a:defRPr sz="1200" kern="1200">
+        <a:solidFill>
+          <a:schemeClr val="tx1"/>
+        </a:solidFill>
+        <a:latin typeface="+mn-lt"/>
+        <a:ea typeface="+mn-ea"/>
+        <a:cs typeface="+mn-cs"/>
+      </a:defRPr>
+    </a:lvl4pPr>
+    <a:lvl5pPr marL="1828800" algn="l" defTabSz="914400" rtl="0" eaLnBrk="1" latinLnBrk="0" hangingPunct="1">
+      <a:defRPr sz="1200" kern="1200">
+        <a:solidFill>
+          <a:schemeClr val="tx1"/>
+        </a:solidFill>
+        <a:latin typeface="+mn-lt"/>
+        <a:ea typeface="+mn-ea"/>
+        <a:cs typeface="+mn-cs"/>
+      </a:defRPr>
+    </a:lvl5pPr>
+    <a:lvl6pPr marL="2286000" algn="l" defTabSz="914400" rtl="0" eaLnBrk="1" latinLnBrk="0" hangingPunct="1">
+      <a:defRPr sz="1200" kern="1200">
+        <a:solidFill>
+          <a:schemeClr val="tx1"/>
+        </a:solidFill>
+        <a:latin typeface="+mn-lt"/>
+        <a:ea typeface="+mn-ea"/>
+        <a:cs typeface="+mn-cs"/>
+      </a:defRPr>
+    </a:lvl6pPr>
+    <a:lvl7pPr marL="2743200" algn="l" defTabSz="914400" rtl="0" eaLnBrk="1" latinLnBrk="0" hangingPunct="1">
+      <a:defRPr sz="1200" kern="1200">
+        <a:solidFill>
+          <a:schemeClr val="tx1"/>
+        </a:solidFill>
+        <a:latin typeface="+mn-lt"/>
+        <a:ea typeface="+mn-ea"/>
+        <a:cs typeface="+mn-cs"/>
+      </a:defRPr>
+    </a:lvl7pPr>
+    <a:lvl8pPr marL="3200400" algn="l" defTabSz="914400" rtl="0" eaLnBrk="1" latinLnBrk="0" hangingPunct="1">
+      <a:defRPr sz="1200" kern="1200">
+        <a:solidFill>
+          <a:schemeClr val="tx1"/>
+        </a:solidFill>
+        <a:latin typeface="+mn-lt"/>
+        <a:ea typeface="+mn-ea"/>
+        <a:cs typeface="+mn-cs"/>
+      </a:defRPr>
+    </a:lvl8pPr>
+    <a:lvl9pPr marL="3657600" algn="l" defTabSz="914400" rtl="0" eaLnBrk="1" latinLnBrk="0" hangingPunct="1">
+      <a:defRPr sz="1200" kern="1200">
+        <a:solidFill>
+          <a:schemeClr val="tx1"/>
+        </a:solidFill>
+        <a:latin typeface="+mn-lt"/>
+        <a:ea typeface="+mn-ea"/>
+        <a:cs typeface="+mn-cs"/>
+      </a:defRPr>
+    </a:lvl9pPr>
+  </p:notesStyle>
+</p:notesMaster>
+</file>
+
+<file path=ppt/notesSlides/notesSlide1.xml><?xml version="1.0" encoding="utf-8"?>
+<p:notes xmlns:a="http://schemas.openxmlformats.org/drawingml/2006/main" xmlns:r="http://schemas.openxmlformats.org/officeDocument/2006/relationships" xmlns:p="http://schemas.openxmlformats.org/presentationml/2006/main">
+  <p:cSld>
+    <p:spTree>
+      <p:nvGrpSpPr>
+        <p:cNvPr id="1" name=""/>
+        <p:cNvGrpSpPr/>
+        <p:nvPr/>
+      </p:nvGrpSpPr>
+      <p:grpSpPr>
+        <a:xfrm>
+          <a:off x="0" y="0"/>
+          <a:ext cx="0" cy="0"/>
+          <a:chOff x="0" y="0"/>
+          <a:chExt cx="0" cy="0"/>
+        </a:xfrm>
+      </p:grpSpPr>
+      <p:sp>
+        <p:nvSpPr>
+          <p:cNvPr id="2" name="Slide Image Placeholder 1"/>
+          <p:cNvSpPr>
+            <a:spLocks noGrp="1" noRot="1" noChangeAspect="1"/>
+          </p:cNvSpPr>
+          <p:nvPr>
+            <p:ph type="sldImg"/>
+          </p:nvPr>
+        </p:nvSpPr>
+        <p:spPr/>
+      </p:sp>
+      <p:sp>
+        <p:nvSpPr>
+          <p:cNvPr id="3" name="Notes Placeholder 2"/>
+          <p:cNvSpPr>
+            <a:spLocks noGrp="1"/>
+          </p:cNvSpPr>
+          <p:nvPr>
+            <p:ph type="body" idx="1"/>
+          </p:nvPr>
+        </p:nvSpPr>
+        <p:spPr/>
+        <p:txBody>
+          <a:bodyPr/>
+          <a:lstStyle/>
+          <a:p>
+            <a:pPr marL="0" marR="0" indent="0" algn="l" defTabSz="914400" rtl="0" eaLnBrk="1" fontAlgn="auto" latinLnBrk="0" hangingPunct="1">
+              <a:lnSpc>
+                <a:spcPct val="100000"/>
+              </a:lnSpc>
+              <a:spcBef>
+                <a:spcPts val="0"/>
+              </a:spcBef>
+              <a:spcAft>
+                <a:spcPts val="0"/>
+              </a:spcAft>
+              <a:buClrTx/>
+              <a:buSzTx/>
+              <a:buFontTx/>
+              <a:buNone/>
+              <a:tabLst/>
+              <a:defRPr/>
+            </a:pPr>
+            <a:r>
+              <a:rPr lang="en-US" dirty="0" smtClean="0"/>
+              <a:t>https://</a:t>
+            </a:r>
+            <a:r>
+              <a:rPr lang="en-US" dirty="0" err="1" smtClean="0"/>
+              <a:t>en.wikipedia.org</a:t>
+            </a:r>
+            <a:r>
+              <a:rPr lang="en-US" dirty="0" smtClean="0"/>
+              <a:t>/wiki/Devanagari</a:t>
+            </a:r>
+          </a:p>
+          <a:p>
+            <a:endParaRPr lang="en-US" dirty="0"/>
+          </a:p>
+        </p:txBody>
+      </p:sp>
+      <p:sp>
+        <p:nvSpPr>
+          <p:cNvPr id="4" name="Slide Number Placeholder 3"/>
+          <p:cNvSpPr>
+            <a:spLocks noGrp="1"/>
+          </p:cNvSpPr>
+          <p:nvPr>
+            <p:ph type="sldNum" sz="quarter" idx="10"/>
+          </p:nvPr>
+        </p:nvSpPr>
+        <p:spPr/>
+        <p:txBody>
+          <a:bodyPr/>
+          <a:lstStyle/>
+          <a:p>
+            <a:fld id="{77153788-2A0D-934D-BA08-953AD1B5A04C}" type="slidenum">
+              <a:rPr lang="en-US" smtClean="0"/>
+              <a:t>2</a:t>
+            </a:fld>
+            <a:endParaRPr lang="en-US"/>
+          </a:p>
+        </p:txBody>
+      </p:sp>
+    </p:spTree>
+    <p:extLst>
+      <p:ext uri="{BB962C8B-B14F-4D97-AF65-F5344CB8AC3E}">
+        <p14:creationId xmlns:p14="http://schemas.microsoft.com/office/powerpoint/2010/main" val="2033284748"/>
+      </p:ext>
+    </p:extLst>
+  </p:cSld>
+  <p:clrMapOvr>
+    <a:masterClrMapping/>
+  </p:clrMapOvr>
+</p:notes>
+</file>
+
+<file path=ppt/notesSlides/notesSlide2.xml><?xml version="1.0" encoding="utf-8"?>
+<p:notes xmlns:a="http://schemas.openxmlformats.org/drawingml/2006/main" xmlns:r="http://schemas.openxmlformats.org/officeDocument/2006/relationships" xmlns:p="http://schemas.openxmlformats.org/presentationml/2006/main">
+  <p:cSld>
+    <p:spTree>
+      <p:nvGrpSpPr>
+        <p:cNvPr id="1" name=""/>
+        <p:cNvGrpSpPr/>
+        <p:nvPr/>
+      </p:nvGrpSpPr>
+      <p:grpSpPr>
+        <a:xfrm>
+          <a:off x="0" y="0"/>
+          <a:ext cx="0" cy="0"/>
+          <a:chOff x="0" y="0"/>
+          <a:chExt cx="0" cy="0"/>
+        </a:xfrm>
+      </p:grpSpPr>
+      <p:sp>
+        <p:nvSpPr>
+          <p:cNvPr id="2" name="Slide Image Placeholder 1"/>
+          <p:cNvSpPr>
+            <a:spLocks noGrp="1" noRot="1" noChangeAspect="1"/>
+          </p:cNvSpPr>
+          <p:nvPr>
+            <p:ph type="sldImg"/>
+          </p:nvPr>
+        </p:nvSpPr>
+        <p:spPr/>
+      </p:sp>
+      <p:sp>
+        <p:nvSpPr>
+          <p:cNvPr id="3" name="Notes Placeholder 2"/>
+          <p:cNvSpPr>
+            <a:spLocks noGrp="1"/>
+          </p:cNvSpPr>
+          <p:nvPr>
+            <p:ph type="body" idx="1"/>
+          </p:nvPr>
+        </p:nvSpPr>
+        <p:spPr/>
+        <p:txBody>
+          <a:bodyPr/>
+          <a:lstStyle/>
+          <a:p>
+            <a:r>
+              <a:rPr lang="en-US" dirty="0" smtClean="0"/>
+              <a:t>http://</a:t>
+            </a:r>
+            <a:r>
+              <a:rPr lang="en-US" dirty="0" err="1" smtClean="0"/>
+              <a:t>makino.linguist.univ-paris-diderot.fr</a:t>
+            </a:r>
+            <a:r>
+              <a:rPr lang="en-US" dirty="0" smtClean="0"/>
+              <a:t>/files/hpsg2010/file/abstracts/MFG/</a:t>
+            </a:r>
+            <a:r>
+              <a:rPr lang="en-US" dirty="0" err="1" smtClean="0"/>
+              <a:t>singh-sarma-mfg.pdf</a:t>
+            </a:r>
+            <a:endParaRPr lang="en-US" dirty="0" smtClean="0"/>
+          </a:p>
+          <a:p>
+            <a:r>
+              <a:rPr lang="en-US" dirty="0" smtClean="0"/>
+              <a:t>http://</a:t>
+            </a:r>
+            <a:r>
+              <a:rPr lang="en-US" dirty="0" err="1" smtClean="0"/>
+              <a:t>www.mindurhindi.com</a:t>
+            </a:r>
+            <a:r>
+              <a:rPr lang="en-US" dirty="0" smtClean="0"/>
+              <a:t>/</a:t>
+            </a:r>
+            <a:r>
+              <a:rPr lang="en-US" dirty="0" err="1" smtClean="0"/>
+              <a:t>hindi</a:t>
+            </a:r>
+            <a:r>
+              <a:rPr lang="en-US" dirty="0" smtClean="0"/>
+              <a:t>-grammar-rule/inflection-</a:t>
+            </a:r>
+            <a:r>
+              <a:rPr lang="en-US" dirty="0" err="1" smtClean="0"/>
+              <a:t>hindi</a:t>
+            </a:r>
+            <a:r>
+              <a:rPr lang="en-US" dirty="0" smtClean="0"/>
+              <a:t>/</a:t>
+            </a:r>
+            <a:endParaRPr lang="en-US" dirty="0"/>
+          </a:p>
+        </p:txBody>
+      </p:sp>
+      <p:sp>
+        <p:nvSpPr>
+          <p:cNvPr id="4" name="Slide Number Placeholder 3"/>
+          <p:cNvSpPr>
+            <a:spLocks noGrp="1"/>
+          </p:cNvSpPr>
+          <p:nvPr>
+            <p:ph type="sldNum" sz="quarter" idx="10"/>
+          </p:nvPr>
+        </p:nvSpPr>
+        <p:spPr/>
+        <p:txBody>
+          <a:bodyPr/>
+          <a:lstStyle/>
+          <a:p>
+            <a:fld id="{77153788-2A0D-934D-BA08-953AD1B5A04C}" type="slidenum">
+              <a:rPr lang="en-US" smtClean="0"/>
+              <a:t>5</a:t>
+            </a:fld>
+            <a:endParaRPr lang="en-US"/>
+          </a:p>
+        </p:txBody>
+      </p:sp>
+    </p:spTree>
+    <p:extLst>
+      <p:ext uri="{BB962C8B-B14F-4D97-AF65-F5344CB8AC3E}">
+        <p14:creationId xmlns:p14="http://schemas.microsoft.com/office/powerpoint/2010/main" val="1732037035"/>
+      </p:ext>
+    </p:extLst>
+  </p:cSld>
+  <p:clrMapOvr>
+    <a:masterClrMapping/>
+  </p:clrMapOvr>
+</p:notes>
 </file>
 
 <file path=ppt/slideLayouts/slideLayout1.xml><?xml version="1.0" encoding="utf-8"?>
@@ -244,7 +848,7 @@
           <a:p>
             <a:fld id="{59C6ED4E-21AA-C640-98BD-04AA41E530F7}" type="datetimeFigureOut">
               <a:rPr lang="en-US" smtClean="0"/>
-              <a:t>10/3/16</a:t>
+              <a:t>10/5/16</a:t>
             </a:fld>
             <a:endParaRPr lang="en-US"/>
           </a:p>
@@ -414,7 +1018,7 @@
           <a:p>
             <a:fld id="{59C6ED4E-21AA-C640-98BD-04AA41E530F7}" type="datetimeFigureOut">
               <a:rPr lang="en-US" smtClean="0"/>
-              <a:t>10/3/16</a:t>
+              <a:t>10/5/16</a:t>
             </a:fld>
             <a:endParaRPr lang="en-US"/>
           </a:p>
@@ -594,7 +1198,7 @@
           <a:p>
             <a:fld id="{59C6ED4E-21AA-C640-98BD-04AA41E530F7}" type="datetimeFigureOut">
               <a:rPr lang="en-US" smtClean="0"/>
-              <a:t>10/3/16</a:t>
+              <a:t>10/5/16</a:t>
             </a:fld>
             <a:endParaRPr lang="en-US"/>
           </a:p>
@@ -764,7 +1368,7 @@
           <a:p>
             <a:fld id="{59C6ED4E-21AA-C640-98BD-04AA41E530F7}" type="datetimeFigureOut">
               <a:rPr lang="en-US" smtClean="0"/>
-              <a:t>10/3/16</a:t>
+              <a:t>10/5/16</a:t>
             </a:fld>
             <a:endParaRPr lang="en-US"/>
           </a:p>
@@ -1010,7 +1614,7 @@
           <a:p>
             <a:fld id="{59C6ED4E-21AA-C640-98BD-04AA41E530F7}" type="datetimeFigureOut">
               <a:rPr lang="en-US" smtClean="0"/>
-              <a:t>10/3/16</a:t>
+              <a:t>10/5/16</a:t>
             </a:fld>
             <a:endParaRPr lang="en-US"/>
           </a:p>
@@ -1242,7 +1846,7 @@
           <a:p>
             <a:fld id="{59C6ED4E-21AA-C640-98BD-04AA41E530F7}" type="datetimeFigureOut">
               <a:rPr lang="en-US" smtClean="0"/>
-              <a:t>10/3/16</a:t>
+              <a:t>10/5/16</a:t>
             </a:fld>
             <a:endParaRPr lang="en-US"/>
           </a:p>
@@ -1609,7 +2213,7 @@
           <a:p>
             <a:fld id="{59C6ED4E-21AA-C640-98BD-04AA41E530F7}" type="datetimeFigureOut">
               <a:rPr lang="en-US" smtClean="0"/>
-              <a:t>10/3/16</a:t>
+              <a:t>10/5/16</a:t>
             </a:fld>
             <a:endParaRPr lang="en-US"/>
           </a:p>
@@ -1727,7 +2331,7 @@
           <a:p>
             <a:fld id="{59C6ED4E-21AA-C640-98BD-04AA41E530F7}" type="datetimeFigureOut">
               <a:rPr lang="en-US" smtClean="0"/>
-              <a:t>10/3/16</a:t>
+              <a:t>10/5/16</a:t>
             </a:fld>
             <a:endParaRPr lang="en-US"/>
           </a:p>
@@ -1822,7 +2426,7 @@
           <a:p>
             <a:fld id="{59C6ED4E-21AA-C640-98BD-04AA41E530F7}" type="datetimeFigureOut">
               <a:rPr lang="en-US" smtClean="0"/>
-              <a:t>10/3/16</a:t>
+              <a:t>10/5/16</a:t>
             </a:fld>
             <a:endParaRPr lang="en-US"/>
           </a:p>
@@ -2099,7 +2703,7 @@
           <a:p>
             <a:fld id="{59C6ED4E-21AA-C640-98BD-04AA41E530F7}" type="datetimeFigureOut">
               <a:rPr lang="en-US" smtClean="0"/>
-              <a:t>10/3/16</a:t>
+              <a:t>10/5/16</a:t>
             </a:fld>
             <a:endParaRPr lang="en-US"/>
           </a:p>
@@ -2352,7 +2956,7 @@
           <a:p>
             <a:fld id="{59C6ED4E-21AA-C640-98BD-04AA41E530F7}" type="datetimeFigureOut">
               <a:rPr lang="en-US" smtClean="0"/>
-              <a:t>10/3/16</a:t>
+              <a:t>10/5/16</a:t>
             </a:fld>
             <a:endParaRPr lang="en-US"/>
           </a:p>
@@ -2565,7 +3169,7 @@
           <a:p>
             <a:fld id="{59C6ED4E-21AA-C640-98BD-04AA41E530F7}" type="datetimeFigureOut">
               <a:rPr lang="en-US" smtClean="0"/>
-              <a:t>10/3/16</a:t>
+              <a:t>10/5/16</a:t>
             </a:fld>
             <a:endParaRPr lang="en-US"/>
           </a:p>
@@ -2956,6 +3560,20 @@
 <file path=ppt/slides/slide1.xml><?xml version="1.0" encoding="utf-8"?>
 <p:sld xmlns:a="http://schemas.openxmlformats.org/drawingml/2006/main" xmlns:r="http://schemas.openxmlformats.org/officeDocument/2006/relationships" xmlns:p="http://schemas.openxmlformats.org/presentationml/2006/main">
   <p:cSld>
+    <p:bg>
+      <p:bgPr>
+        <a:blipFill dpi="0" rotWithShape="1">
+          <a:blip r:embed="rId2">
+            <a:lum/>
+          </a:blip>
+          <a:srcRect/>
+          <a:stretch>
+            <a:fillRect l="7000" t="-16000" r="-3000" b="-49000"/>
+          </a:stretch>
+        </a:blipFill>
+        <a:effectLst/>
+      </p:bgPr>
+    </p:bg>
     <p:spTree>
       <p:nvGrpSpPr>
         <p:cNvPr id="1" name=""/>
@@ -2980,15 +3598,18 @@
             <p:ph type="ctrTitle"/>
           </p:nvPr>
         </p:nvSpPr>
-        <p:spPr/>
-        <p:txBody>
-          <a:bodyPr/>
-          <a:lstStyle/>
-          <a:p>
-            <a:r>
-              <a:rPr lang="en-US" dirty="0" smtClean="0"/>
-              <a:t>Hindi</a:t>
-            </a:r>
+        <p:spPr>
+          <a:xfrm>
+            <a:off x="0" y="-10028696"/>
+            <a:ext cx="427630" cy="627797"/>
+          </a:xfrm>
+        </p:spPr>
+        <p:txBody>
+          <a:bodyPr>
+            <a:normAutofit fontScale="90000"/>
+          </a:bodyPr>
+          <a:lstStyle/>
+          <a:p>
             <a:endParaRPr lang="en-US" dirty="0"/>
           </a:p>
         </p:txBody>
@@ -3003,12 +3624,33 @@
             <p:ph type="subTitle" idx="1"/>
           </p:nvPr>
         </p:nvSpPr>
-        <p:spPr/>
-        <p:txBody>
-          <a:bodyPr/>
-          <a:lstStyle/>
-          <a:p>
-            <a:endParaRPr lang="en-US"/>
+        <p:spPr>
+          <a:xfrm>
+            <a:off x="10586114" y="5991366"/>
+            <a:ext cx="1605886" cy="1337481"/>
+          </a:xfrm>
+        </p:spPr>
+        <p:txBody>
+          <a:bodyPr>
+            <a:normAutofit/>
+          </a:bodyPr>
+          <a:lstStyle/>
+          <a:p>
+            <a:r>
+              <a:rPr lang="en-US" dirty="0" err="1" smtClean="0"/>
+              <a:t>Arif</a:t>
+            </a:r>
+            <a:r>
+              <a:rPr lang="en-US" dirty="0" smtClean="0"/>
+              <a:t> Ali</a:t>
+            </a:r>
+          </a:p>
+          <a:p>
+            <a:r>
+              <a:rPr lang="en-US" dirty="0" smtClean="0"/>
+              <a:t>LING 572</a:t>
+            </a:r>
+            <a:endParaRPr lang="en-US" dirty="0"/>
           </a:p>
         </p:txBody>
       </p:sp>
@@ -3022,6 +3664,14 @@
   <p:clrMapOvr>
     <a:masterClrMapping/>
   </p:clrMapOvr>
+  <mc:AlternateContent xmlns:mc="http://schemas.openxmlformats.org/markup-compatibility/2006" xmlns:p14="http://schemas.microsoft.com/office/powerpoint/2010/main">
+    <mc:Choice Requires="p14">
+      <p:transition spd="slow" p14:dur="2000" advTm="6389"/>
+    </mc:Choice>
+    <mc:Fallback xmlns="">
+      <p:transition spd="slow" advTm="6389"/>
+    </mc:Fallback>
+  </mc:AlternateContent>
   <p:timing>
     <p:tnLst>
       <p:par>
@@ -3084,12 +3734,14 @@
         </p:nvSpPr>
         <p:spPr/>
         <p:txBody>
-          <a:bodyPr/>
-          <a:lstStyle/>
-          <a:p>
-            <a:r>
-              <a:rPr lang="en-US" dirty="0" smtClean="0"/>
-              <a:t>It’s the official Language of India</a:t>
+          <a:bodyPr>
+            <a:normAutofit lnSpcReduction="10000"/>
+          </a:bodyPr>
+          <a:lstStyle/>
+          <a:p>
+            <a:r>
+              <a:rPr lang="en-US" dirty="0" smtClean="0"/>
+              <a:t>It’s one of the official Languages of India</a:t>
             </a:r>
           </a:p>
           <a:p>
@@ -3100,28 +3752,113 @@
             </a:pPr>
             <a:r>
               <a:rPr lang="en-US" dirty="0" smtClean="0"/>
-              <a:t>There is a different dialect spoken in Fiji, but considered different </a:t>
-            </a:r>
+              <a:t>There is a different dialect that the official language in Fiji</a:t>
+            </a:r>
+          </a:p>
+          <a:p>
+            <a:pPr marL="685800" lvl="2">
+              <a:spcBef>
+                <a:spcPts val="1000"/>
+              </a:spcBef>
+            </a:pPr>
+            <a:r>
+              <a:rPr lang="en-US" dirty="0" smtClean="0"/>
+              <a:t>It has approximately 380 million speakers</a:t>
+            </a:r>
+          </a:p>
+          <a:p>
+            <a:pPr marL="228600" lvl="1">
+              <a:spcBef>
+                <a:spcPts val="1000"/>
+              </a:spcBef>
+            </a:pPr>
+            <a:r>
+              <a:rPr lang="en-US" sz="2800" dirty="0"/>
+              <a:t>Hindi is an Indo-European language</a:t>
+            </a:r>
+          </a:p>
+          <a:p>
+            <a:pPr marL="685800" lvl="2">
+              <a:spcBef>
+                <a:spcPts val="1000"/>
+              </a:spcBef>
+            </a:pPr>
+            <a:r>
+              <a:rPr lang="en-US" dirty="0"/>
+              <a:t>The parent group is Hindustani (Hindi and Urdu belong to this group)</a:t>
+            </a:r>
+          </a:p>
+          <a:p>
+            <a:pPr marL="685800" lvl="2">
+              <a:spcBef>
+                <a:spcPts val="1000"/>
+              </a:spcBef>
+            </a:pPr>
+            <a:r>
+              <a:rPr lang="en-US" dirty="0"/>
+              <a:t>Regional languages such as Gujarati and Marathi are similar</a:t>
+            </a:r>
+          </a:p>
+          <a:p>
+            <a:pPr marL="228600" lvl="1">
+              <a:spcBef>
+                <a:spcPts val="1000"/>
+              </a:spcBef>
+            </a:pPr>
+            <a:r>
+              <a:rPr lang="en-US" sz="2800" dirty="0"/>
+              <a:t>The Script is Devanagari (</a:t>
+            </a:r>
+            <a:r>
+              <a:rPr lang="en-US" sz="2800" b="1" i="1" u="sng" cap="small" dirty="0">
+                <a:hlinkClick r:id="rId3" tooltip="Help:Pronunciation respelling key"/>
+              </a:rPr>
+              <a:t>day</a:t>
+            </a:r>
+            <a:r>
+              <a:rPr lang="en-US" sz="2800" i="1" u="sng" dirty="0">
+                <a:hlinkClick r:id="rId3" tooltip="Help:Pronunciation respelling key"/>
+              </a:rPr>
+              <a:t>-və-</a:t>
+            </a:r>
+            <a:r>
+              <a:rPr lang="en-US" sz="2800" b="1" i="1" u="sng" cap="small" dirty="0">
+                <a:hlinkClick r:id="rId3" tooltip="Help:Pronunciation respelling key"/>
+              </a:rPr>
+              <a:t>nah</a:t>
+            </a:r>
+            <a:r>
+              <a:rPr lang="en-US" sz="2800" i="1" u="sng" dirty="0">
+                <a:hlinkClick r:id="rId3" tooltip="Help:Pronunciation respelling key"/>
+              </a:rPr>
+              <a:t>-gər-ee</a:t>
+            </a:r>
+            <a:r>
+              <a:rPr lang="en-US" sz="2800" dirty="0"/>
+              <a:t>)</a:t>
+            </a:r>
+          </a:p>
+          <a:p>
+            <a:pPr lvl="1"/>
+            <a:r>
+              <a:rPr lang="en-US" dirty="0"/>
+              <a:t>It has 33 consonants and 11 vowels</a:t>
+            </a:r>
+          </a:p>
+          <a:p>
+            <a:r>
+              <a:rPr lang="en-US" dirty="0"/>
+              <a:t>It’s an SOV language</a:t>
+            </a:r>
+          </a:p>
+          <a:p>
+            <a:r>
+              <a:rPr lang="en-US" dirty="0"/>
+              <a:t>It’s synthetic and phonetic</a:t>
+            </a:r>
+          </a:p>
+          <a:p>
             <a:endParaRPr lang="en-US" dirty="0" smtClean="0"/>
-          </a:p>
-          <a:p>
-            <a:r>
-              <a:rPr lang="en-US" dirty="0" smtClean="0"/>
-              <a:t>It has approximately 310 million native speakers</a:t>
-            </a:r>
-          </a:p>
-          <a:p>
-            <a:pPr lvl="1"/>
-            <a:r>
-              <a:rPr lang="en-US" dirty="0" smtClean="0"/>
-              <a:t>Fourth most spoken Language in the world</a:t>
-            </a:r>
-          </a:p>
-          <a:p>
-            <a:r>
-              <a:rPr lang="en-US" dirty="0" smtClean="0"/>
-              <a:t>It’s the lingua franca of only part of India</a:t>
-            </a:r>
           </a:p>
         </p:txBody>
       </p:sp>
@@ -3135,6 +3872,14 @@
   <p:clrMapOvr>
     <a:masterClrMapping/>
   </p:clrMapOvr>
+  <mc:AlternateContent xmlns:mc="http://schemas.openxmlformats.org/markup-compatibility/2006" xmlns:p14="http://schemas.microsoft.com/office/powerpoint/2010/main">
+    <mc:Choice Requires="p14">
+      <p:transition spd="slow" p14:dur="2000" advTm="60420"/>
+    </mc:Choice>
+    <mc:Fallback xmlns="">
+      <p:transition spd="slow" advTm="60420"/>
+    </mc:Fallback>
+  </mc:AlternateContent>
   <p:timing>
     <p:tnLst>
       <p:par>
@@ -3177,49 +3922,200 @@
           <a:bodyPr/>
           <a:lstStyle/>
           <a:p>
+            <a:r>
+              <a:rPr lang="en-US" dirty="0" smtClean="0"/>
+              <a:t>Example</a:t>
+            </a:r>
             <a:endParaRPr lang="en-US" dirty="0"/>
           </a:p>
         </p:txBody>
       </p:sp>
-      <p:pic>
-        <p:nvPicPr>
-          <p:cNvPr id="4" name="Content Placeholder 3"/>
-          <p:cNvPicPr>
-            <a:picLocks noGrp="1" noChangeAspect="1"/>
-          </p:cNvPicPr>
+      <p:sp>
+        <p:nvSpPr>
+          <p:cNvPr id="3" name="Content Placeholder 2"/>
+          <p:cNvSpPr>
+            <a:spLocks noGrp="1"/>
+          </p:cNvSpPr>
           <p:nvPr>
             <p:ph idx="1"/>
           </p:nvPr>
-        </p:nvPicPr>
-        <p:blipFill>
-          <a:blip r:embed="rId2">
-            <a:extLst>
-              <a:ext uri="{28A0092B-C50C-407E-A947-70E740481C1C}">
-                <a14:useLocalDpi xmlns:a14="http://schemas.microsoft.com/office/drawing/2010/main" val="0"/>
-              </a:ext>
-            </a:extLst>
-          </a:blip>
-          <a:stretch>
-            <a:fillRect/>
-          </a:stretch>
-        </p:blipFill>
-        <p:spPr>
-          <a:xfrm>
-            <a:off x="2951911" y="365124"/>
-            <a:ext cx="5740267" cy="6400399"/>
-          </a:xfrm>
-        </p:spPr>
-      </p:pic>
+        </p:nvSpPr>
+        <p:spPr/>
+        <p:txBody>
+          <a:bodyPr/>
+          <a:lstStyle/>
+          <a:p>
+            <a:pPr marL="0" indent="0" algn="ctr">
+              <a:buNone/>
+            </a:pPr>
+            <a:r>
+              <a:rPr lang="hi-in" dirty="0" smtClean="0"/>
+              <a:t>मेरा </a:t>
+            </a:r>
+            <a:r>
+              <a:rPr lang="en-US" dirty="0" smtClean="0"/>
+              <a:t>	</a:t>
+            </a:r>
+            <a:r>
+              <a:rPr lang="hi-in" dirty="0" smtClean="0"/>
+              <a:t>नाम</a:t>
+            </a:r>
+            <a:r>
+              <a:rPr lang="en-US" dirty="0" smtClean="0"/>
+              <a:t>	</a:t>
+            </a:r>
+            <a:r>
+              <a:rPr lang="hi-in" dirty="0" smtClean="0"/>
+              <a:t>आरिफ </a:t>
+            </a:r>
+            <a:r>
+              <a:rPr lang="en-US" dirty="0" smtClean="0"/>
+              <a:t>    </a:t>
+            </a:r>
+            <a:r>
+              <a:rPr lang="hi-in" dirty="0" smtClean="0"/>
+              <a:t>है</a:t>
+            </a:r>
+            <a:endParaRPr lang="en-US" dirty="0" smtClean="0"/>
+          </a:p>
+          <a:p>
+            <a:pPr marL="0" indent="0" algn="ctr">
+              <a:buNone/>
+            </a:pPr>
+            <a:r>
+              <a:rPr lang="en-US" dirty="0" err="1" smtClean="0"/>
+              <a:t>meɾa</a:t>
+            </a:r>
+            <a:r>
+              <a:rPr lang="en-US" dirty="0" smtClean="0"/>
+              <a:t>	</a:t>
+            </a:r>
+            <a:r>
+              <a:rPr lang="en-US" dirty="0" err="1" smtClean="0"/>
+              <a:t>naam</a:t>
+            </a:r>
+            <a:r>
+              <a:rPr lang="en-US" dirty="0" smtClean="0"/>
+              <a:t>	   </a:t>
+            </a:r>
+            <a:r>
+              <a:rPr lang="en-US" dirty="0" err="1" smtClean="0"/>
+              <a:t>Arif</a:t>
+            </a:r>
+            <a:r>
+              <a:rPr lang="en-US" dirty="0"/>
+              <a:t>	</a:t>
+            </a:r>
+            <a:r>
+              <a:rPr lang="en-US" dirty="0" smtClean="0"/>
+              <a:t>   Hai</a:t>
+            </a:r>
+          </a:p>
+          <a:p>
+            <a:pPr marL="0" indent="0" algn="ctr">
+              <a:buNone/>
+            </a:pPr>
+            <a:r>
+              <a:rPr lang="en-US" dirty="0" smtClean="0"/>
+              <a:t>My    Name 	 </a:t>
+            </a:r>
+            <a:r>
+              <a:rPr lang="en-US" dirty="0" err="1" smtClean="0"/>
+              <a:t>Arif</a:t>
+            </a:r>
+            <a:r>
+              <a:rPr lang="en-US" dirty="0" smtClean="0"/>
+              <a:t> 	  Is</a:t>
+            </a:r>
+          </a:p>
+          <a:p>
+            <a:pPr marL="0" indent="0" algn="ctr">
+              <a:buNone/>
+            </a:pPr>
+            <a:endParaRPr lang="en-US" dirty="0"/>
+          </a:p>
+          <a:p>
+            <a:pPr marL="0" indent="0" algn="ctr">
+              <a:buNone/>
+            </a:pPr>
+            <a:r>
+              <a:rPr lang="hi-in" dirty="0"/>
+              <a:t>मुझे </a:t>
+            </a:r>
+            <a:r>
+              <a:rPr lang="en-US" dirty="0" smtClean="0"/>
+              <a:t>	</a:t>
+            </a:r>
+            <a:r>
+              <a:rPr lang="hi-in" dirty="0" smtClean="0"/>
+              <a:t>सोना </a:t>
+            </a:r>
+            <a:r>
+              <a:rPr lang="en-US" dirty="0" smtClean="0"/>
+              <a:t>	</a:t>
+            </a:r>
+            <a:r>
+              <a:rPr lang="hi-in" dirty="0" smtClean="0"/>
+              <a:t>है</a:t>
+            </a:r>
+            <a:endParaRPr lang="en-US" dirty="0" smtClean="0"/>
+          </a:p>
+          <a:p>
+            <a:pPr marL="0" indent="0" algn="ctr">
+              <a:buNone/>
+            </a:pPr>
+            <a:r>
+              <a:rPr lang="en-US" dirty="0" err="1" smtClean="0"/>
+              <a:t>mujhe</a:t>
+            </a:r>
+            <a:r>
+              <a:rPr lang="en-US" dirty="0" smtClean="0"/>
+              <a:t>    </a:t>
+            </a:r>
+            <a:r>
+              <a:rPr lang="en-US" dirty="0" err="1" smtClean="0"/>
+              <a:t>sona</a:t>
+            </a:r>
+            <a:r>
+              <a:rPr lang="en-US" dirty="0" smtClean="0"/>
+              <a:t>  </a:t>
+            </a:r>
+            <a:r>
+              <a:rPr lang="en-US" dirty="0" err="1" smtClean="0"/>
+              <a:t>hai</a:t>
+            </a:r>
+            <a:endParaRPr lang="en-US" dirty="0" smtClean="0"/>
+          </a:p>
+          <a:p>
+            <a:pPr marL="0" indent="0" algn="ctr">
+              <a:buNone/>
+            </a:pPr>
+            <a:r>
+              <a:rPr lang="en-US" dirty="0" smtClean="0"/>
+              <a:t>I need	    sleep   to</a:t>
+            </a:r>
+            <a:endParaRPr lang="en-US" dirty="0"/>
+          </a:p>
+        </p:txBody>
+      </p:sp>
     </p:spTree>
     <p:extLst>
       <p:ext uri="{BB962C8B-B14F-4D97-AF65-F5344CB8AC3E}">
-        <p14:creationId xmlns:p14="http://schemas.microsoft.com/office/powerpoint/2010/main" val="169504469"/>
+        <p14:creationId xmlns:p14="http://schemas.microsoft.com/office/powerpoint/2010/main" val="950391347"/>
       </p:ext>
     </p:extLst>
   </p:cSld>
   <p:clrMapOvr>
     <a:masterClrMapping/>
   </p:clrMapOvr>
+  <mc:AlternateContent xmlns:mc="http://schemas.openxmlformats.org/markup-compatibility/2006" xmlns:p14="http://schemas.microsoft.com/office/powerpoint/2010/main">
+    <mc:Choice Requires="p14">
+      <p:transition spd="slow" p14:dur="2000" advTm="49296"/>
+    </mc:Choice>
+    <mc:Fallback xmlns="">
+      <p:transition spd="slow" advTm="49296"/>
+    </mc:Fallback>
+  </mc:AlternateContent>
   <p:timing>
     <p:tnLst>
       <p:par>
@@ -3263,99 +4159,205 @@
           <a:lstStyle/>
           <a:p>
             <a:r>
-              <a:rPr lang="en-US" dirty="0" smtClean="0"/>
-              <a:t>Fun Facts Continued</a:t>
-            </a:r>
-            <a:r>
-              <a:rPr lang="mr-IN" dirty="0" smtClean="0"/>
-              <a:t>…</a:t>
-            </a:r>
-            <a:r>
-              <a:rPr lang="en-US" dirty="0" smtClean="0"/>
-              <a:t>.</a:t>
-            </a:r>
+              <a:rPr lang="en-US" dirty="0"/>
+              <a:t>Noun and Verbs Inflection</a:t>
+            </a:r>
+          </a:p>
+        </p:txBody>
+      </p:sp>
+      <p:sp>
+        <p:nvSpPr>
+          <p:cNvPr id="3" name="Content Placeholder 2"/>
+          <p:cNvSpPr>
+            <a:spLocks noGrp="1"/>
+          </p:cNvSpPr>
+          <p:nvPr>
+            <p:ph idx="1"/>
+          </p:nvPr>
+        </p:nvSpPr>
+        <p:spPr/>
+        <p:txBody>
+          <a:bodyPr/>
+          <a:lstStyle/>
+          <a:p>
+            <a:r>
+              <a:rPr lang="en-US" dirty="0" smtClean="0"/>
+              <a:t>Hindi </a:t>
+            </a:r>
+            <a:r>
+              <a:rPr lang="en-US" dirty="0" smtClean="0"/>
+              <a:t>has </a:t>
+            </a:r>
+            <a:r>
+              <a:rPr lang="en-US" dirty="0" smtClean="0"/>
+              <a:t>Masculine and Famine ending for nouns</a:t>
+            </a:r>
+          </a:p>
+          <a:p>
+            <a:pPr lvl="1"/>
+            <a:r>
+              <a:rPr lang="en-US" dirty="0" smtClean="0"/>
+              <a:t>Male Singular: </a:t>
+            </a:r>
+            <a:r>
+              <a:rPr lang="hi-in" dirty="0" smtClean="0"/>
+              <a:t>मेरा</a:t>
+            </a:r>
+            <a:r>
+              <a:rPr lang="en-US" dirty="0" smtClean="0"/>
+              <a:t> (</a:t>
+            </a:r>
+            <a:r>
+              <a:rPr lang="en-US" dirty="0" err="1" smtClean="0"/>
+              <a:t>meɾa</a:t>
+            </a:r>
+            <a:r>
+              <a:rPr lang="en-US" dirty="0" smtClean="0"/>
+              <a:t>)</a:t>
+            </a:r>
+          </a:p>
+          <a:p>
+            <a:pPr lvl="1"/>
+            <a:r>
+              <a:rPr lang="en-US" dirty="0" smtClean="0"/>
+              <a:t>Female Singular: </a:t>
+            </a:r>
+            <a:r>
+              <a:rPr lang="hi-in" dirty="0" smtClean="0"/>
+              <a:t>मेरी</a:t>
+            </a:r>
+            <a:r>
+              <a:rPr lang="en-US" dirty="0" smtClean="0"/>
+              <a:t> (</a:t>
+            </a:r>
+            <a:r>
+              <a:rPr lang="en-US" dirty="0" err="1" smtClean="0"/>
+              <a:t>meree</a:t>
+            </a:r>
+            <a:r>
+              <a:rPr lang="en-US" dirty="0" smtClean="0"/>
+              <a:t>)</a:t>
+            </a:r>
+          </a:p>
+          <a:p>
+            <a:r>
+              <a:rPr lang="en-US" dirty="0"/>
+              <a:t>Hindi </a:t>
+            </a:r>
+            <a:r>
+              <a:rPr lang="en-US" dirty="0" smtClean="0"/>
+              <a:t>has </a:t>
+            </a:r>
+            <a:r>
+              <a:rPr lang="en-US" dirty="0"/>
+              <a:t>Masculine and Famine ending for </a:t>
+            </a:r>
+            <a:r>
+              <a:rPr lang="en-US" dirty="0" smtClean="0"/>
+              <a:t>verbs</a:t>
+            </a:r>
+          </a:p>
+          <a:p>
+            <a:pPr lvl="1"/>
+            <a:r>
+              <a:rPr lang="en-US" dirty="0" smtClean="0"/>
+              <a:t>Male </a:t>
+            </a:r>
+            <a:r>
+              <a:rPr lang="hi-in" dirty="0" smtClean="0"/>
+              <a:t>मैंने पढ़ा</a:t>
+            </a:r>
+            <a:r>
+              <a:rPr lang="en-US" dirty="0" smtClean="0"/>
+              <a:t> </a:t>
+            </a:r>
+            <a:r>
+              <a:rPr lang="hi-in" dirty="0"/>
+              <a:t> हूँ </a:t>
+            </a:r>
+            <a:r>
+              <a:rPr lang="en-US" dirty="0" smtClean="0"/>
+              <a:t>(</a:t>
+            </a:r>
+            <a:r>
+              <a:rPr lang="en-US" dirty="0" err="1"/>
+              <a:t>mainne</a:t>
+            </a:r>
+            <a:r>
+              <a:rPr lang="en-US" dirty="0"/>
+              <a:t> </a:t>
+            </a:r>
+            <a:r>
+              <a:rPr lang="en-US" dirty="0" err="1" smtClean="0"/>
+              <a:t>padha</a:t>
+            </a:r>
+            <a:r>
+              <a:rPr lang="en-US" dirty="0" smtClean="0"/>
+              <a:t> </a:t>
+            </a:r>
+            <a:r>
+              <a:rPr lang="en-US" dirty="0" err="1" smtClean="0"/>
+              <a:t>hoon</a:t>
+            </a:r>
+            <a:r>
+              <a:rPr lang="en-US" dirty="0" smtClean="0"/>
+              <a:t>) I read</a:t>
+            </a:r>
+          </a:p>
+          <a:p>
+            <a:pPr lvl="1"/>
+            <a:r>
+              <a:rPr lang="en-US" dirty="0" smtClean="0"/>
+              <a:t>Female </a:t>
+            </a:r>
+            <a:r>
+              <a:rPr lang="hi-in" dirty="0"/>
+              <a:t>मैं </a:t>
+            </a:r>
+            <a:r>
+              <a:rPr lang="hi-in" dirty="0" smtClean="0"/>
+              <a:t>पढ़ती हूँ</a:t>
+            </a:r>
+            <a:r>
+              <a:rPr lang="en-US" dirty="0" smtClean="0"/>
+              <a:t> (</a:t>
+            </a:r>
+            <a:r>
+              <a:rPr lang="en-US" i="1" dirty="0" err="1" smtClean="0"/>
+              <a:t>mainne</a:t>
+            </a:r>
+            <a:r>
+              <a:rPr lang="en-US" i="1" dirty="0" smtClean="0"/>
+              <a:t> </a:t>
+            </a:r>
+            <a:r>
+              <a:rPr lang="en-US" dirty="0" err="1"/>
+              <a:t>padhatee</a:t>
+            </a:r>
+            <a:r>
+              <a:rPr lang="en-US" dirty="0"/>
+              <a:t> </a:t>
+            </a:r>
+            <a:r>
+              <a:rPr lang="en-US" i="1" dirty="0" err="1" smtClean="0"/>
+              <a:t>hoon</a:t>
+            </a:r>
+            <a:r>
+              <a:rPr lang="en-US" i="1" dirty="0" smtClean="0"/>
+              <a:t>) I read</a:t>
+            </a:r>
+            <a:endParaRPr lang="en-US" dirty="0" smtClean="0"/>
+          </a:p>
+          <a:p>
+            <a:pPr lvl="1"/>
             <a:endParaRPr lang="en-US" dirty="0"/>
-          </a:p>
-        </p:txBody>
-      </p:sp>
-      <p:sp>
-        <p:nvSpPr>
-          <p:cNvPr id="3" name="Content Placeholder 2"/>
-          <p:cNvSpPr>
-            <a:spLocks noGrp="1"/>
-          </p:cNvSpPr>
-          <p:nvPr>
-            <p:ph idx="1"/>
-          </p:nvPr>
-        </p:nvSpPr>
-        <p:spPr/>
-        <p:txBody>
-          <a:bodyPr/>
-          <a:lstStyle/>
-          <a:p>
-            <a:pPr marL="228600" lvl="1">
-              <a:spcBef>
-                <a:spcPts val="1000"/>
-              </a:spcBef>
-            </a:pPr>
-            <a:r>
-              <a:rPr lang="en-US" dirty="0" smtClean="0"/>
-              <a:t>Hindi is an Indo-European language</a:t>
-            </a:r>
-          </a:p>
-          <a:p>
-            <a:pPr marL="685800" lvl="2">
-              <a:spcBef>
-                <a:spcPts val="1000"/>
-              </a:spcBef>
-            </a:pPr>
-            <a:r>
-              <a:rPr lang="en-US" dirty="0" smtClean="0"/>
-              <a:t>Along with Urdu, it’s also referred to Hindustani </a:t>
-            </a:r>
-          </a:p>
-          <a:p>
-            <a:pPr marL="685800" lvl="2">
-              <a:spcBef>
-                <a:spcPts val="1000"/>
-              </a:spcBef>
-            </a:pPr>
-            <a:r>
-              <a:rPr lang="en-US" dirty="0" smtClean="0"/>
-              <a:t>Regional languages such as Gujarati and Marathi are similar</a:t>
-            </a:r>
-          </a:p>
-          <a:p>
-            <a:r>
-              <a:rPr lang="en-US" dirty="0" smtClean="0"/>
-              <a:t>It’s an SVO language</a:t>
-            </a:r>
-          </a:p>
-          <a:p>
-            <a:r>
-              <a:rPr lang="en-US" dirty="0" smtClean="0"/>
-              <a:t>It’s synthetic</a:t>
-            </a:r>
-          </a:p>
-          <a:p>
-            <a:r>
-              <a:rPr lang="en-US" dirty="0" smtClean="0"/>
-              <a:t>masculine/feminine</a:t>
-            </a:r>
-          </a:p>
-          <a:p>
-            <a:pPr lvl="1"/>
-            <a:r>
-              <a:rPr lang="en-US" dirty="0" smtClean="0"/>
-              <a:t>Also a </a:t>
-            </a:r>
           </a:p>
         </p:txBody>
       </p:sp>
     </p:spTree>
     <p:extLst>
       <p:ext uri="{BB962C8B-B14F-4D97-AF65-F5344CB8AC3E}">
-        <p14:creationId xmlns:p14="http://schemas.microsoft.com/office/powerpoint/2010/main" val="116433693"/>
+        <p14:creationId xmlns:p14="http://schemas.microsoft.com/office/powerpoint/2010/main" val="524711182"/>
       </p:ext>
     </p:extLst>
   </p:cSld>
@@ -3406,7 +4408,7 @@
           <a:p>
             <a:r>
               <a:rPr lang="en-US" dirty="0" smtClean="0"/>
-              <a:t>Difficulties in NLP</a:t>
+              <a:t>Noun and Verbs Inflection Examples</a:t>
             </a:r>
             <a:endParaRPr lang="en-US" dirty="0"/>
           </a:p>
@@ -3424,23 +4426,326 @@
         </p:nvSpPr>
         <p:spPr/>
         <p:txBody>
-          <a:bodyPr/>
-          <a:lstStyle/>
-          <a:p>
-            <a:endParaRPr lang="en-US"/>
+          <a:bodyPr>
+            <a:normAutofit/>
+          </a:bodyPr>
+          <a:lstStyle/>
+          <a:p>
+            <a:r>
+              <a:rPr lang="en-US" dirty="0" smtClean="0"/>
+              <a:t>Nouns and verbs are also </a:t>
+            </a:r>
+            <a:r>
+              <a:rPr lang="en-US" dirty="0" smtClean="0"/>
+              <a:t>singular</a:t>
+            </a:r>
+            <a:r>
+              <a:rPr lang="en-US" dirty="0" smtClean="0"/>
+              <a:t>/ plural </a:t>
+            </a:r>
+            <a:r>
+              <a:rPr lang="en-US" dirty="0" err="1" smtClean="0"/>
+              <a:t>dependant</a:t>
+            </a:r>
+            <a:r>
+              <a:rPr lang="en-US" smtClean="0"/>
+              <a:t> </a:t>
+            </a:r>
+            <a:endParaRPr lang="en-US" dirty="0" smtClean="0"/>
+          </a:p>
+          <a:p>
+            <a:pPr lvl="1"/>
+            <a:r>
+              <a:rPr lang="en-US" dirty="0" smtClean="0"/>
+              <a:t>examples</a:t>
+            </a:r>
+          </a:p>
+          <a:p>
+            <a:pPr lvl="2"/>
+            <a:r>
+              <a:rPr lang="en-US" dirty="0" smtClean="0"/>
+              <a:t>Female singular </a:t>
+            </a:r>
+            <a:r>
+              <a:rPr lang="hi-in" dirty="0" smtClean="0"/>
+              <a:t>मेरी किताब</a:t>
+            </a:r>
+            <a:r>
+              <a:rPr lang="en-US" dirty="0" smtClean="0"/>
+              <a:t> (</a:t>
+            </a:r>
+            <a:r>
+              <a:rPr lang="en-US" dirty="0" err="1"/>
+              <a:t>meree</a:t>
+            </a:r>
+            <a:r>
+              <a:rPr lang="en-US" dirty="0"/>
+              <a:t> </a:t>
+            </a:r>
+            <a:r>
+              <a:rPr lang="en-US" dirty="0" err="1" smtClean="0"/>
+              <a:t>kitaab</a:t>
+            </a:r>
+            <a:r>
+              <a:rPr lang="en-US" dirty="0" smtClean="0"/>
+              <a:t>) My book</a:t>
+            </a:r>
+          </a:p>
+          <a:p>
+            <a:pPr lvl="2"/>
+            <a:r>
+              <a:rPr lang="en-US" dirty="0" smtClean="0"/>
+              <a:t>Male multiple </a:t>
+            </a:r>
+            <a:r>
+              <a:rPr lang="hi-in" dirty="0"/>
+              <a:t>हमारे हवाई </a:t>
+            </a:r>
+            <a:r>
+              <a:rPr lang="hi-in" dirty="0" smtClean="0"/>
+              <a:t>जहाज</a:t>
+            </a:r>
+            <a:r>
+              <a:rPr lang="en-US" dirty="0" smtClean="0"/>
+              <a:t> (</a:t>
+            </a:r>
+            <a:r>
+              <a:rPr lang="en-US" dirty="0" err="1"/>
+              <a:t>hamaare</a:t>
+            </a:r>
+            <a:r>
+              <a:rPr lang="en-US" dirty="0"/>
+              <a:t> </a:t>
+            </a:r>
+            <a:r>
+              <a:rPr lang="en-US" dirty="0" err="1"/>
+              <a:t>havaee</a:t>
+            </a:r>
+            <a:r>
+              <a:rPr lang="en-US" dirty="0"/>
+              <a:t> </a:t>
+            </a:r>
+            <a:r>
+              <a:rPr lang="en-US" dirty="0" err="1"/>
+              <a:t>jahaaj</a:t>
+            </a:r>
+            <a:r>
+              <a:rPr lang="en-US" dirty="0" smtClean="0"/>
+              <a:t>) Our airplanes</a:t>
+            </a:r>
+            <a:endParaRPr lang="en-US" dirty="0"/>
+          </a:p>
+          <a:p>
+            <a:r>
+              <a:rPr lang="en-US" dirty="0" smtClean="0"/>
+              <a:t>Verb can also express tense:</a:t>
+            </a:r>
+          </a:p>
+          <a:p>
+            <a:pPr lvl="1"/>
+            <a:r>
+              <a:rPr lang="en-US" dirty="0" smtClean="0"/>
+              <a:t>Now: </a:t>
+            </a:r>
+            <a:r>
+              <a:rPr lang="hi-in" dirty="0"/>
+              <a:t>मैं बास्केटबॉल खेल रहा हूँ </a:t>
+            </a:r>
+            <a:r>
+              <a:rPr lang="en-US" dirty="0" smtClean="0"/>
+              <a:t>(</a:t>
+            </a:r>
+            <a:r>
+              <a:rPr lang="en-US" dirty="0"/>
+              <a:t>main </a:t>
+            </a:r>
+            <a:r>
+              <a:rPr lang="en-US" dirty="0" err="1"/>
+              <a:t>baasketabol</a:t>
+            </a:r>
+            <a:r>
+              <a:rPr lang="en-US" dirty="0"/>
+              <a:t> </a:t>
+            </a:r>
+            <a:r>
+              <a:rPr lang="en-US" dirty="0" err="1"/>
+              <a:t>khel</a:t>
+            </a:r>
+            <a:r>
+              <a:rPr lang="en-US" dirty="0"/>
+              <a:t> </a:t>
+            </a:r>
+            <a:r>
+              <a:rPr lang="en-US" dirty="0" err="1"/>
+              <a:t>raha</a:t>
+            </a:r>
+            <a:r>
+              <a:rPr lang="en-US" dirty="0"/>
+              <a:t> </a:t>
+            </a:r>
+            <a:r>
+              <a:rPr lang="en-US" dirty="0" err="1"/>
+              <a:t>hoon</a:t>
+            </a:r>
+            <a:r>
+              <a:rPr lang="en-US" dirty="0" smtClean="0"/>
+              <a:t>) </a:t>
+            </a:r>
+            <a:r>
+              <a:rPr lang="en-US" dirty="0" smtClean="0"/>
+              <a:t>I’m playing basketball</a:t>
+            </a:r>
+          </a:p>
+          <a:p>
+            <a:pPr lvl="1"/>
+            <a:r>
+              <a:rPr lang="en-US" dirty="0" smtClean="0"/>
+              <a:t>Future </a:t>
+            </a:r>
+            <a:r>
+              <a:rPr lang="hi-in" dirty="0"/>
+              <a:t>मैं </a:t>
+            </a:r>
+            <a:r>
+              <a:rPr lang="mr-IN" dirty="0" err="1"/>
+              <a:t>बास्केटबॉल</a:t>
+            </a:r>
+            <a:r>
+              <a:rPr lang="mr-IN" dirty="0"/>
+              <a:t> </a:t>
+            </a:r>
+            <a:r>
+              <a:rPr lang="hi-in" dirty="0" smtClean="0"/>
+              <a:t>खेलेंगे</a:t>
+            </a:r>
+            <a:r>
+              <a:rPr lang="en-US" dirty="0" smtClean="0"/>
+              <a:t> </a:t>
+            </a:r>
+            <a:r>
+              <a:rPr lang="en-US" dirty="0" smtClean="0"/>
+              <a:t>(</a:t>
+            </a:r>
+            <a:r>
+              <a:rPr lang="en-US" dirty="0" err="1" smtClean="0"/>
+              <a:t>mainne</a:t>
+            </a:r>
+            <a:r>
+              <a:rPr lang="en-US" dirty="0" smtClean="0"/>
+              <a:t> </a:t>
+            </a:r>
+            <a:r>
+              <a:rPr lang="en-US" dirty="0" err="1"/>
+              <a:t>baasketabol</a:t>
+            </a:r>
+            <a:r>
+              <a:rPr lang="en-US" dirty="0"/>
+              <a:t> </a:t>
+            </a:r>
+            <a:r>
+              <a:rPr lang="en-US" dirty="0" err="1"/>
+              <a:t>khelenge</a:t>
+            </a:r>
+            <a:r>
+              <a:rPr lang="en-US" dirty="0" smtClean="0"/>
+              <a:t>) </a:t>
+            </a:r>
+            <a:r>
+              <a:rPr lang="en-US" dirty="0" smtClean="0"/>
+              <a:t>I will play basketball</a:t>
+            </a:r>
+          </a:p>
+          <a:p>
+            <a:pPr lvl="1"/>
+            <a:r>
+              <a:rPr lang="en-US" dirty="0" smtClean="0"/>
+              <a:t>Past </a:t>
+            </a:r>
+            <a:r>
+              <a:rPr lang="hi-in" dirty="0" smtClean="0"/>
+              <a:t>मैं </a:t>
+            </a:r>
+            <a:r>
+              <a:rPr lang="mr-IN" dirty="0" err="1"/>
+              <a:t>बास्केटबॉल</a:t>
+            </a:r>
+            <a:r>
+              <a:rPr lang="mr-IN" dirty="0"/>
+              <a:t> </a:t>
+            </a:r>
+            <a:r>
+              <a:rPr lang="hi-in" dirty="0" smtClean="0"/>
+              <a:t>खेला</a:t>
+            </a:r>
+            <a:r>
+              <a:rPr lang="en-US" dirty="0" smtClean="0"/>
+              <a:t> (</a:t>
+            </a:r>
+            <a:r>
+              <a:rPr lang="en-US" dirty="0" err="1" smtClean="0"/>
+              <a:t>mainne</a:t>
+            </a:r>
+            <a:r>
+              <a:rPr lang="en-US" dirty="0" smtClean="0"/>
+              <a:t> </a:t>
+            </a:r>
+            <a:r>
+              <a:rPr lang="en-US" dirty="0" err="1"/>
+              <a:t>baasketabol</a:t>
+            </a:r>
+            <a:r>
+              <a:rPr lang="en-US" dirty="0"/>
+              <a:t> </a:t>
+            </a:r>
+            <a:r>
+              <a:rPr lang="en-US" dirty="0" err="1" smtClean="0"/>
+              <a:t>khela</a:t>
+            </a:r>
+            <a:r>
+              <a:rPr lang="en-US" dirty="0" smtClean="0"/>
+              <a:t>) I played basketball</a:t>
+            </a:r>
+            <a:r>
+              <a:rPr lang="en-US" dirty="0"/>
+              <a:t/>
+            </a:r>
+            <a:br>
+              <a:rPr lang="en-US" dirty="0"/>
+            </a:br>
+            <a:endParaRPr lang="en-US" dirty="0"/>
+          </a:p>
+          <a:p>
+            <a:pPr lvl="1"/>
+            <a:endParaRPr lang="en-US" dirty="0" smtClean="0"/>
+          </a:p>
+          <a:p>
+            <a:pPr lvl="1"/>
+            <a:endParaRPr lang="en-US" dirty="0" smtClean="0"/>
+          </a:p>
+          <a:p>
+            <a:pPr lvl="1"/>
+            <a:endParaRPr lang="en-US" dirty="0" smtClean="0"/>
           </a:p>
         </p:txBody>
       </p:sp>
     </p:spTree>
     <p:extLst>
       <p:ext uri="{BB962C8B-B14F-4D97-AF65-F5344CB8AC3E}">
-        <p14:creationId xmlns:p14="http://schemas.microsoft.com/office/powerpoint/2010/main" val="1914614636"/>
+        <p14:creationId xmlns:p14="http://schemas.microsoft.com/office/powerpoint/2010/main" val="1312602784"/>
       </p:ext>
     </p:extLst>
   </p:cSld>
   <p:clrMapOvr>
     <a:masterClrMapping/>
   </p:clrMapOvr>
+  <mc:AlternateContent xmlns:mc="http://schemas.openxmlformats.org/markup-compatibility/2006" xmlns:p14="http://schemas.microsoft.com/office/powerpoint/2010/main">
+    <mc:Choice Requires="p14">
+      <p:transition spd="slow" p14:dur="2000" advTm="78331"/>
+    </mc:Choice>
+    <mc:Fallback xmlns="">
+      <p:transition spd="slow" advTm="78331"/>
+    </mc:Fallback>
+  </mc:AlternateContent>
   <p:timing>
     <p:tnLst>
       <p:par>
@@ -3485,7 +4790,7 @@
           <a:p>
             <a:r>
               <a:rPr lang="en-US" dirty="0" smtClean="0"/>
-              <a:t>Example</a:t>
+              <a:t>Difficulties in NLP</a:t>
             </a:r>
             <a:endParaRPr lang="en-US" dirty="0"/>
           </a:p>
@@ -3506,102 +4811,127 @@
           <a:bodyPr/>
           <a:lstStyle/>
           <a:p>
-            <a:pPr marL="0" indent="0" algn="ctr">
-              <a:buNone/>
-            </a:pPr>
-            <a:r>
-              <a:rPr lang="hi-in" dirty="0" smtClean="0"/>
-              <a:t>मेरा </a:t>
-            </a:r>
-            <a:r>
-              <a:rPr lang="en-US" dirty="0" smtClean="0"/>
-              <a:t>	</a:t>
-            </a:r>
-            <a:r>
-              <a:rPr lang="hi-in" dirty="0" smtClean="0"/>
-              <a:t>नाम</a:t>
-            </a:r>
-            <a:r>
-              <a:rPr lang="en-US" dirty="0" smtClean="0"/>
-              <a:t>	</a:t>
-            </a:r>
-            <a:r>
-              <a:rPr lang="hi-in" dirty="0" smtClean="0"/>
-              <a:t>आरिफ </a:t>
-            </a:r>
-            <a:r>
-              <a:rPr lang="en-US" dirty="0" smtClean="0"/>
-              <a:t>    </a:t>
-            </a:r>
-            <a:r>
-              <a:rPr lang="hi-in" dirty="0" smtClean="0"/>
-              <a:t>है</a:t>
-            </a:r>
-            <a:endParaRPr lang="en-US" dirty="0" smtClean="0"/>
-          </a:p>
-          <a:p>
-            <a:pPr marL="0" indent="0" algn="ctr">
-              <a:buNone/>
-            </a:pPr>
-            <a:r>
-              <a:rPr lang="en-US" dirty="0" err="1" smtClean="0"/>
-              <a:t>meɾa</a:t>
-            </a:r>
-            <a:r>
-              <a:rPr lang="en-US" dirty="0" smtClean="0"/>
-              <a:t>	</a:t>
-            </a:r>
-            <a:r>
-              <a:rPr lang="en-US" dirty="0" err="1" smtClean="0"/>
-              <a:t>naam</a:t>
-            </a:r>
-            <a:r>
-              <a:rPr lang="en-US" dirty="0" smtClean="0"/>
-              <a:t>	   </a:t>
-            </a:r>
-            <a:r>
-              <a:rPr lang="en-US" dirty="0" err="1" smtClean="0"/>
-              <a:t>Arif</a:t>
+            <a:r>
+              <a:rPr lang="en-US" dirty="0" smtClean="0"/>
+              <a:t>Like English, certain words have multiple meanings:</a:t>
+            </a:r>
+          </a:p>
+          <a:p>
+            <a:pPr lvl="1"/>
+            <a:r>
+              <a:rPr lang="en-US" dirty="0" err="1"/>
+              <a:t>धन</a:t>
             </a:r>
             <a:r>
               <a:rPr lang="en-US" dirty="0"/>
-              <a:t>	</a:t>
-            </a:r>
-            <a:r>
-              <a:rPr lang="en-US" dirty="0" smtClean="0"/>
-              <a:t>   Hai</a:t>
-            </a:r>
-          </a:p>
-          <a:p>
-            <a:pPr marL="0" indent="0" algn="ctr">
-              <a:buNone/>
-            </a:pPr>
-            <a:r>
-              <a:rPr lang="en-US" dirty="0" smtClean="0"/>
-              <a:t>My    Name 	 </a:t>
-            </a:r>
-            <a:r>
-              <a:rPr lang="en-US" dirty="0" err="1" smtClean="0"/>
-              <a:t>Arif</a:t>
-            </a:r>
-            <a:r>
-              <a:rPr lang="en-US" dirty="0" smtClean="0"/>
-              <a:t> 	  Is</a:t>
-            </a:r>
-            <a:endParaRPr lang="en-US" dirty="0"/>
+              <a:t> (</a:t>
+            </a:r>
+            <a:r>
+              <a:rPr lang="en-US" dirty="0" err="1"/>
+              <a:t>dhan</a:t>
+            </a:r>
+            <a:r>
+              <a:rPr lang="en-US" dirty="0"/>
+              <a:t>) can mean wealth or addition</a:t>
+            </a:r>
+          </a:p>
+          <a:p>
+            <a:pPr lvl="1"/>
+            <a:r>
+              <a:rPr lang="mr-IN" dirty="0"/>
+              <a:t>ऋण</a:t>
+            </a:r>
+            <a:r>
+              <a:rPr lang="en-US" dirty="0"/>
+              <a:t> (</a:t>
+            </a:r>
+            <a:r>
+              <a:rPr lang="en-US" dirty="0" err="1"/>
+              <a:t>rn</a:t>
+            </a:r>
+            <a:r>
+              <a:rPr lang="en-US" dirty="0"/>
+              <a:t>) can mean debt or </a:t>
+            </a:r>
+            <a:r>
+              <a:rPr lang="en-US" dirty="0" smtClean="0"/>
+              <a:t>subtraction</a:t>
+            </a:r>
+          </a:p>
+          <a:p>
+            <a:r>
+              <a:rPr lang="en-US" dirty="0" smtClean="0"/>
+              <a:t>Certain </a:t>
+            </a:r>
+            <a:r>
+              <a:rPr lang="en-US" dirty="0"/>
+              <a:t>versions of ”you” have different meanings in context</a:t>
+            </a:r>
+          </a:p>
+          <a:p>
+            <a:pPr lvl="1"/>
+            <a:r>
+              <a:rPr lang="en-US" dirty="0" err="1"/>
+              <a:t>आप</a:t>
+            </a:r>
+            <a:r>
+              <a:rPr lang="en-US" dirty="0"/>
+              <a:t> (</a:t>
+            </a:r>
+            <a:r>
+              <a:rPr lang="en-US" dirty="0" err="1"/>
+              <a:t>aap</a:t>
+            </a:r>
+            <a:r>
+              <a:rPr lang="en-US" dirty="0"/>
+              <a:t>) is a formal use of “you” and </a:t>
+            </a:r>
+            <a:r>
+              <a:rPr lang="en-US" dirty="0" err="1"/>
+              <a:t>तु</a:t>
+            </a:r>
+            <a:r>
+              <a:rPr lang="en-US" dirty="0"/>
+              <a:t> (too) is </a:t>
+            </a:r>
+            <a:r>
+              <a:rPr lang="en-US" dirty="0" smtClean="0"/>
+              <a:t>informal</a:t>
+            </a:r>
+          </a:p>
+          <a:p>
+            <a:r>
+              <a:rPr lang="en-US" dirty="0" smtClean="0"/>
+              <a:t>Hindi speakers are generally multilingual</a:t>
+            </a:r>
+          </a:p>
+          <a:p>
+            <a:pPr lvl="1"/>
+            <a:r>
+              <a:rPr lang="en-US" dirty="0" smtClean="0"/>
+              <a:t>This affects standard sentence structure in documents</a:t>
+            </a:r>
           </a:p>
         </p:txBody>
       </p:sp>
     </p:spTree>
     <p:extLst>
       <p:ext uri="{BB962C8B-B14F-4D97-AF65-F5344CB8AC3E}">
-        <p14:creationId xmlns:p14="http://schemas.microsoft.com/office/powerpoint/2010/main" val="950391347"/>
+        <p14:creationId xmlns:p14="http://schemas.microsoft.com/office/powerpoint/2010/main" val="1914614636"/>
       </p:ext>
     </p:extLst>
   </p:cSld>
   <p:clrMapOvr>
     <a:masterClrMapping/>
   </p:clrMapOvr>
+  <mc:AlternateContent xmlns:mc="http://schemas.openxmlformats.org/markup-compatibility/2006" xmlns:p14="http://schemas.microsoft.com/office/powerpoint/2010/main">
+    <mc:Choice Requires="p14">
+      <p:transition spd="slow" p14:dur="2000" advTm="61942"/>
+    </mc:Choice>
+    <mc:Fallback xmlns="">
+      <p:transition spd="slow" advTm="61942"/>
+    </mc:Fallback>
+  </mc:AlternateContent>
   <p:timing>
     <p:tnLst>
       <p:par>
@@ -3679,15 +5009,54 @@
               <a:buNone/>
             </a:pPr>
             <a:r>
+              <a:rPr lang="en-US" dirty="0">
+                <a:hlinkClick r:id="rId2"/>
+              </a:rPr>
+              <a:t>https://</a:t>
+            </a:r>
+            <a:r>
               <a:rPr lang="en-US" dirty="0" smtClean="0">
                 <a:hlinkClick r:id="rId2"/>
               </a:rPr>
-              <a:t>https://www.youtube.com/watch?v=is6d3UrGqyw</a:t>
-            </a:r>
-            <a:r>
-              <a:rPr lang="en-US" dirty="0" smtClean="0"/>
+              <a:t>youtu.be</a:t>
+            </a:r>
+            <a:r>
+              <a:rPr lang="en-US" smtClean="0">
+                <a:hlinkClick r:id="rId2"/>
+              </a:rPr>
+              <a:t>/is6d3UrGqyw?t=8s</a:t>
+            </a:r>
+            <a:r>
+              <a:rPr lang="en-US" smtClean="0"/>
               <a:t> </a:t>
             </a:r>
+            <a:endParaRPr lang="en-US" dirty="0" smtClean="0"/>
+          </a:p>
+        </p:txBody>
+      </p:sp>
+      <p:sp>
+        <p:nvSpPr>
+          <p:cNvPr id="4" name="TextBox 3"/>
+          <p:cNvSpPr txBox="1"/>
+          <p:nvPr/>
+        </p:nvSpPr>
+        <p:spPr>
+          <a:xfrm>
+            <a:off x="7601803" y="1323833"/>
+            <a:ext cx="184731" cy="369332"/>
+          </a:xfrm>
+          <a:prstGeom prst="rect">
+            <a:avLst/>
+          </a:prstGeom>
+          <a:noFill/>
+        </p:spPr>
+        <p:txBody>
+          <a:bodyPr wrap="none" rtlCol="0">
+            <a:spAutoFit/>
+          </a:bodyPr>
+          <a:lstStyle/>
+          <a:p>
+            <a:endParaRPr lang="en-US" dirty="0"/>
           </a:p>
         </p:txBody>
       </p:sp>
@@ -3701,6 +5070,14 @@
   <p:clrMapOvr>
     <a:masterClrMapping/>
   </p:clrMapOvr>
+  <mc:AlternateContent xmlns:mc="http://schemas.openxmlformats.org/markup-compatibility/2006" xmlns:p14="http://schemas.microsoft.com/office/powerpoint/2010/main">
+    <mc:Choice Requires="p14">
+      <p:transition spd="slow" p14:dur="2000" advTm="9047"/>
+    </mc:Choice>
+    <mc:Fallback xmlns="">
+      <p:transition spd="slow" advTm="9047"/>
+    </mc:Fallback>
+  </mc:AlternateContent>
   <p:timing>
     <p:tnLst>
       <p:par>
@@ -3970,4 +5347,265 @@
     </a:ext>
   </a:extLst>
 </a:theme>
+</file>
+
+<file path=ppt/theme/theme2.xml><?xml version="1.0" encoding="utf-8"?>
+<a:theme xmlns:a="http://schemas.openxmlformats.org/drawingml/2006/main" name="Office Theme">
+  <a:themeElements>
+    <a:clrScheme name="Office">
+      <a:dk1>
+        <a:sysClr val="windowText" lastClr="000000"/>
+      </a:dk1>
+      <a:lt1>
+        <a:sysClr val="window" lastClr="FFFFFF"/>
+      </a:lt1>
+      <a:dk2>
+        <a:srgbClr val="44546A"/>
+      </a:dk2>
+      <a:lt2>
+        <a:srgbClr val="E7E6E6"/>
+      </a:lt2>
+      <a:accent1>
+        <a:srgbClr val="5B9BD5"/>
+      </a:accent1>
+      <a:accent2>
+        <a:srgbClr val="ED7D31"/>
+      </a:accent2>
+      <a:accent3>
+        <a:srgbClr val="A5A5A5"/>
+      </a:accent3>
+      <a:accent4>
+        <a:srgbClr val="FFC000"/>
+      </a:accent4>
+      <a:accent5>
+        <a:srgbClr val="4472C4"/>
+      </a:accent5>
+      <a:accent6>
+        <a:srgbClr val="70AD47"/>
+      </a:accent6>
+      <a:hlink>
+        <a:srgbClr val="0563C1"/>
+      </a:hlink>
+      <a:folHlink>
+        <a:srgbClr val="954F72"/>
+      </a:folHlink>
+    </a:clrScheme>
+    <a:fontScheme name="Office">
+      <a:majorFont>
+        <a:latin typeface="Calibri Light" panose="020F0302020204030204"/>
+        <a:ea typeface=""/>
+        <a:cs typeface=""/>
+        <a:font script="Jpan" typeface="Yu Gothic Light"/>
+        <a:font script="Hang" typeface="맑은 고딕"/>
+        <a:font script="Hans" typeface="DengXian Light"/>
+        <a:font script="Hant" typeface="新細明體"/>
+        <a:font script="Arab" typeface="Times New Roman"/>
+        <a:font script="Hebr" typeface="Times New Roman"/>
+        <a:font script="Thai" typeface="Angsana New"/>
+        <a:font script="Ethi" typeface="Nyala"/>
+        <a:font script="Beng" typeface="Vrinda"/>
+        <a:font script="Gujr" typeface="Shruti"/>
+        <a:font script="Khmr" typeface="MoolBoran"/>
+        <a:font script="Knda" typeface="Tunga"/>
+        <a:font script="Guru" typeface="Raavi"/>
+        <a:font script="Cans" typeface="Euphemia"/>
+        <a:font script="Cher" typeface="Plantagenet Cherokee"/>
+        <a:font script="Yiii" typeface="Microsoft Yi Baiti"/>
+        <a:font script="Tibt" typeface="Microsoft Himalaya"/>
+        <a:font script="Thaa" typeface="MV Boli"/>
+        <a:font script="Deva" typeface="Mangal"/>
+        <a:font script="Telu" typeface="Gautami"/>
+        <a:font script="Taml" typeface="Latha"/>
+        <a:font script="Syrc" typeface="Estrangelo Edessa"/>
+        <a:font script="Orya" typeface="Kalinga"/>
+        <a:font script="Mlym" typeface="Kartika"/>
+        <a:font script="Laoo" typeface="DokChampa"/>
+        <a:font script="Sinh" typeface="Iskoola Pota"/>
+        <a:font script="Mong" typeface="Mongolian Baiti"/>
+        <a:font script="Viet" typeface="Times New Roman"/>
+        <a:font script="Uigh" typeface="Microsoft Uighur"/>
+        <a:font script="Geor" typeface="Sylfaen"/>
+      </a:majorFont>
+      <a:minorFont>
+        <a:latin typeface="Calibri" panose="020F0502020204030204"/>
+        <a:ea typeface=""/>
+        <a:cs typeface=""/>
+        <a:font script="Jpan" typeface="Yu Gothic"/>
+        <a:font script="Hang" typeface="맑은 고딕"/>
+        <a:font script="Hans" typeface="DengXian"/>
+        <a:font script="Hant" typeface="新細明體"/>
+        <a:font script="Arab" typeface="Arial"/>
+        <a:font script="Hebr" typeface="Arial"/>
+        <a:font script="Thai" typeface="Cordia New"/>
+        <a:font script="Ethi" typeface="Nyala"/>
+        <a:font script="Beng" typeface="Vrinda"/>
+        <a:font script="Gujr" typeface="Shruti"/>
+        <a:font script="Khmr" typeface="DaunPenh"/>
+        <a:font script="Knda" typeface="Tunga"/>
+        <a:font script="Guru" typeface="Raavi"/>
+        <a:font script="Cans" typeface="Euphemia"/>
+        <a:font script="Cher" typeface="Plantagenet Cherokee"/>
+        <a:font script="Yiii" typeface="Microsoft Yi Baiti"/>
+        <a:font script="Tibt" typeface="Microsoft Himalaya"/>
+        <a:font script="Thaa" typeface="MV Boli"/>
+        <a:font script="Deva" typeface="Mangal"/>
+        <a:font script="Telu" typeface="Gautami"/>
+        <a:font script="Taml" typeface="Latha"/>
+        <a:font script="Syrc" typeface="Estrangelo Edessa"/>
+        <a:font script="Orya" typeface="Kalinga"/>
+        <a:font script="Mlym" typeface="Kartika"/>
+        <a:font script="Laoo" typeface="DokChampa"/>
+        <a:font script="Sinh" typeface="Iskoola Pota"/>
+        <a:font script="Mong" typeface="Mongolian Baiti"/>
+        <a:font script="Viet" typeface="Arial"/>
+        <a:font script="Uigh" typeface="Microsoft Uighur"/>
+        <a:font script="Geor" typeface="Sylfaen"/>
+      </a:minorFont>
+    </a:fontScheme>
+    <a:fmtScheme name="Office">
+      <a:fillStyleLst>
+        <a:solidFill>
+          <a:schemeClr val="phClr"/>
+        </a:solidFill>
+        <a:gradFill rotWithShape="1">
+          <a:gsLst>
+            <a:gs pos="0">
+              <a:schemeClr val="phClr">
+                <a:lumMod val="110000"/>
+                <a:satMod val="105000"/>
+                <a:tint val="67000"/>
+              </a:schemeClr>
+            </a:gs>
+            <a:gs pos="50000">
+              <a:schemeClr val="phClr">
+                <a:lumMod val="105000"/>
+                <a:satMod val="103000"/>
+                <a:tint val="73000"/>
+              </a:schemeClr>
+            </a:gs>
+            <a:gs pos="100000">
+              <a:schemeClr val="phClr">
+                <a:lumMod val="105000"/>
+                <a:satMod val="109000"/>
+                <a:tint val="81000"/>
+              </a:schemeClr>
+            </a:gs>
+          </a:gsLst>
+          <a:lin ang="5400000" scaled="0"/>
+        </a:gradFill>
+        <a:gradFill rotWithShape="1">
+          <a:gsLst>
+            <a:gs pos="0">
+              <a:schemeClr val="phClr">
+                <a:satMod val="103000"/>
+                <a:lumMod val="102000"/>
+                <a:tint val="94000"/>
+              </a:schemeClr>
+            </a:gs>
+            <a:gs pos="50000">
+              <a:schemeClr val="phClr">
+                <a:satMod val="110000"/>
+                <a:lumMod val="100000"/>
+                <a:shade val="100000"/>
+              </a:schemeClr>
+            </a:gs>
+            <a:gs pos="100000">
+              <a:schemeClr val="phClr">
+                <a:lumMod val="99000"/>
+                <a:satMod val="120000"/>
+                <a:shade val="78000"/>
+              </a:schemeClr>
+            </a:gs>
+          </a:gsLst>
+          <a:lin ang="5400000" scaled="0"/>
+        </a:gradFill>
+      </a:fillStyleLst>
+      <a:lnStyleLst>
+        <a:ln w="6350" cap="flat" cmpd="sng" algn="ctr">
+          <a:solidFill>
+            <a:schemeClr val="phClr"/>
+          </a:solidFill>
+          <a:prstDash val="solid"/>
+          <a:miter lim="800000"/>
+        </a:ln>
+        <a:ln w="12700" cap="flat" cmpd="sng" algn="ctr">
+          <a:solidFill>
+            <a:schemeClr val="phClr"/>
+          </a:solidFill>
+          <a:prstDash val="solid"/>
+          <a:miter lim="800000"/>
+        </a:ln>
+        <a:ln w="19050" cap="flat" cmpd="sng" algn="ctr">
+          <a:solidFill>
+            <a:schemeClr val="phClr"/>
+          </a:solidFill>
+          <a:prstDash val="solid"/>
+          <a:miter lim="800000"/>
+        </a:ln>
+      </a:lnStyleLst>
+      <a:effectStyleLst>
+        <a:effectStyle>
+          <a:effectLst/>
+        </a:effectStyle>
+        <a:effectStyle>
+          <a:effectLst/>
+        </a:effectStyle>
+        <a:effectStyle>
+          <a:effectLst>
+            <a:outerShdw blurRad="57150" dist="19050" dir="5400000" algn="ctr" rotWithShape="0">
+              <a:srgbClr val="000000">
+                <a:alpha val="63000"/>
+              </a:srgbClr>
+            </a:outerShdw>
+          </a:effectLst>
+        </a:effectStyle>
+      </a:effectStyleLst>
+      <a:bgFillStyleLst>
+        <a:solidFill>
+          <a:schemeClr val="phClr"/>
+        </a:solidFill>
+        <a:solidFill>
+          <a:schemeClr val="phClr">
+            <a:tint val="95000"/>
+            <a:satMod val="170000"/>
+          </a:schemeClr>
+        </a:solidFill>
+        <a:gradFill rotWithShape="1">
+          <a:gsLst>
+            <a:gs pos="0">
+              <a:schemeClr val="phClr">
+                <a:tint val="93000"/>
+                <a:satMod val="150000"/>
+                <a:shade val="98000"/>
+                <a:lumMod val="102000"/>
+              </a:schemeClr>
+            </a:gs>
+            <a:gs pos="50000">
+              <a:schemeClr val="phClr">
+                <a:tint val="98000"/>
+                <a:satMod val="130000"/>
+                <a:shade val="90000"/>
+                <a:lumMod val="103000"/>
+              </a:schemeClr>
+            </a:gs>
+            <a:gs pos="100000">
+              <a:schemeClr val="phClr">
+                <a:shade val="63000"/>
+                <a:satMod val="120000"/>
+              </a:schemeClr>
+            </a:gs>
+          </a:gsLst>
+          <a:lin ang="5400000" scaled="0"/>
+        </a:gradFill>
+      </a:bgFillStyleLst>
+    </a:fmtScheme>
+  </a:themeElements>
+  <a:objectDefaults/>
+  <a:extraClrSchemeLst/>
+  <a:extLst>
+    <a:ext uri="{05A4C25C-085E-4340-85A3-A5531E510DB2}">
+      <thm15:themeFamily xmlns:thm15="http://schemas.microsoft.com/office/thememl/2012/main" name="Office Theme" id="{62F939B6-93AF-4DB8-9C6B-D6C7DFDC589F}" vid="{4A3C46E8-61CC-4603-A589-7422A47A8E4A}"/>
+    </a:ext>
+  </a:extLst>
+</a:theme>
 </file>
</xml_diff>